<commit_message>
feature(chart): add setExtendedChartData and chartEx related modifiers (WIP)
</commit_message>
<xml_diff>
--- a/__tests__/pptx-templates/ChartWaterfall.pptx
+++ b/__tests__/pptx-templates/ChartWaterfall.pptx
@@ -107,6 +107,11 @@
       </a:defRPr>
     </a:lvl9pPr>
   </p:defaultTextStyle>
+  <p:extLst>
+    <p:ext uri="{EFAFB233-063F-42B5-8137-9DF3F51BA10A}">
+      <p15:sldGuideLst xmlns:p15="http://schemas.microsoft.com/office/powerpoint/2012/main"/>
+    </p:ext>
+  </p:extLst>
 </p:presentation>
 </file>
 
@@ -812,7 +817,7 @@
           <a:p>
             <a:fld id="{C56BDBFF-10BC-48E5-A88D-2055B548AA9A}" type="datetimeFigureOut">
               <a:rPr lang="de-DE" smtClean="0"/>
-              <a:t>31.10.2022</a:t>
+              <a:t>07.12.2022</a:t>
             </a:fld>
             <a:endParaRPr lang="de-DE"/>
           </a:p>
@@ -1313,7 +1318,7 @@
           <a:p>
             <a:fld id="{676CA232-FB8C-4A43-B170-F9384B374447}" type="datetimeFigureOut">
               <a:rPr lang="de-DE" smtClean="0"/>
-              <a:t>31.10.2022</a:t>
+              <a:t>07.12.2022</a:t>
             </a:fld>
             <a:endParaRPr lang="de-DE"/>
           </a:p>
@@ -1511,7 +1516,7 @@
           <a:p>
             <a:fld id="{676CA232-FB8C-4A43-B170-F9384B374447}" type="datetimeFigureOut">
               <a:rPr lang="de-DE" smtClean="0"/>
-              <a:t>31.10.2022</a:t>
+              <a:t>07.12.2022</a:t>
             </a:fld>
             <a:endParaRPr lang="de-DE"/>
           </a:p>
@@ -1719,7 +1724,7 @@
           <a:p>
             <a:fld id="{676CA232-FB8C-4A43-B170-F9384B374447}" type="datetimeFigureOut">
               <a:rPr lang="de-DE" smtClean="0"/>
-              <a:t>31.10.2022</a:t>
+              <a:t>07.12.2022</a:t>
             </a:fld>
             <a:endParaRPr lang="de-DE"/>
           </a:p>
@@ -1917,7 +1922,7 @@
           <a:p>
             <a:fld id="{676CA232-FB8C-4A43-B170-F9384B374447}" type="datetimeFigureOut">
               <a:rPr lang="de-DE" smtClean="0"/>
-              <a:t>31.10.2022</a:t>
+              <a:t>07.12.2022</a:t>
             </a:fld>
             <a:endParaRPr lang="de-DE"/>
           </a:p>
@@ -2192,7 +2197,7 @@
           <a:p>
             <a:fld id="{676CA232-FB8C-4A43-B170-F9384B374447}" type="datetimeFigureOut">
               <a:rPr lang="de-DE" smtClean="0"/>
-              <a:t>31.10.2022</a:t>
+              <a:t>07.12.2022</a:t>
             </a:fld>
             <a:endParaRPr lang="de-DE"/>
           </a:p>
@@ -2457,7 +2462,7 @@
           <a:p>
             <a:fld id="{676CA232-FB8C-4A43-B170-F9384B374447}" type="datetimeFigureOut">
               <a:rPr lang="de-DE" smtClean="0"/>
-              <a:t>31.10.2022</a:t>
+              <a:t>07.12.2022</a:t>
             </a:fld>
             <a:endParaRPr lang="de-DE"/>
           </a:p>
@@ -2869,7 +2874,7 @@
           <a:p>
             <a:fld id="{676CA232-FB8C-4A43-B170-F9384B374447}" type="datetimeFigureOut">
               <a:rPr lang="de-DE" smtClean="0"/>
-              <a:t>31.10.2022</a:t>
+              <a:t>07.12.2022</a:t>
             </a:fld>
             <a:endParaRPr lang="de-DE"/>
           </a:p>
@@ -3010,7 +3015,7 @@
           <a:p>
             <a:fld id="{676CA232-FB8C-4A43-B170-F9384B374447}" type="datetimeFigureOut">
               <a:rPr lang="de-DE" smtClean="0"/>
-              <a:t>31.10.2022</a:t>
+              <a:t>07.12.2022</a:t>
             </a:fld>
             <a:endParaRPr lang="de-DE"/>
           </a:p>
@@ -3123,7 +3128,7 @@
           <a:p>
             <a:fld id="{676CA232-FB8C-4A43-B170-F9384B374447}" type="datetimeFigureOut">
               <a:rPr lang="de-DE" smtClean="0"/>
-              <a:t>31.10.2022</a:t>
+              <a:t>07.12.2022</a:t>
             </a:fld>
             <a:endParaRPr lang="de-DE"/>
           </a:p>
@@ -3434,7 +3439,7 @@
           <a:p>
             <a:fld id="{676CA232-FB8C-4A43-B170-F9384B374447}" type="datetimeFigureOut">
               <a:rPr lang="de-DE" smtClean="0"/>
-              <a:t>31.10.2022</a:t>
+              <a:t>07.12.2022</a:t>
             </a:fld>
             <a:endParaRPr lang="de-DE"/>
           </a:p>
@@ -3722,7 +3727,7 @@
           <a:p>
             <a:fld id="{676CA232-FB8C-4A43-B170-F9384B374447}" type="datetimeFigureOut">
               <a:rPr lang="de-DE" smtClean="0"/>
-              <a:t>31.10.2022</a:t>
+              <a:t>07.12.2022</a:t>
             </a:fld>
             <a:endParaRPr lang="de-DE"/>
           </a:p>
@@ -3963,7 +3968,7 @@
           <a:p>
             <a:fld id="{676CA232-FB8C-4A43-B170-F9384B374447}" type="datetimeFigureOut">
               <a:rPr lang="de-DE" smtClean="0"/>
-              <a:t>31.10.2022</a:t>
+              <a:t>07.12.2022</a:t>
             </a:fld>
             <a:endParaRPr lang="de-DE"/>
           </a:p>

</xml_diff>